<commit_message>
Massive rename: DbDesign -> DbInit.
</commit_message>
<xml_diff>
--- a/src/Docs/primitives/RdoNetOverview.pptx
+++ b/src/Docs/primitives/RdoNetOverview.pptx
@@ -243,7 +243,7 @@
           <a:p>
             <a:fld id="{E2DC313C-E62C-4C22-A1E0-847D782FC8C3}" type="datetimeFigureOut">
               <a:rPr lang="en-US" smtClean="0"/>
-              <a:t>5/22/2019</a:t>
+              <a:t>8/30/2019</a:t>
             </a:fld>
             <a:endParaRPr lang="en-US"/>
           </a:p>
@@ -413,7 +413,7 @@
           <a:p>
             <a:fld id="{E2DC313C-E62C-4C22-A1E0-847D782FC8C3}" type="datetimeFigureOut">
               <a:rPr lang="en-US" smtClean="0"/>
-              <a:t>5/22/2019</a:t>
+              <a:t>8/30/2019</a:t>
             </a:fld>
             <a:endParaRPr lang="en-US"/>
           </a:p>
@@ -593,7 +593,7 @@
           <a:p>
             <a:fld id="{E2DC313C-E62C-4C22-A1E0-847D782FC8C3}" type="datetimeFigureOut">
               <a:rPr lang="en-US" smtClean="0"/>
-              <a:t>5/22/2019</a:t>
+              <a:t>8/30/2019</a:t>
             </a:fld>
             <a:endParaRPr lang="en-US"/>
           </a:p>
@@ -763,7 +763,7 @@
           <a:p>
             <a:fld id="{E2DC313C-E62C-4C22-A1E0-847D782FC8C3}" type="datetimeFigureOut">
               <a:rPr lang="en-US" smtClean="0"/>
-              <a:t>5/22/2019</a:t>
+              <a:t>8/30/2019</a:t>
             </a:fld>
             <a:endParaRPr lang="en-US"/>
           </a:p>
@@ -1009,7 +1009,7 @@
           <a:p>
             <a:fld id="{E2DC313C-E62C-4C22-A1E0-847D782FC8C3}" type="datetimeFigureOut">
               <a:rPr lang="en-US" smtClean="0"/>
-              <a:t>5/22/2019</a:t>
+              <a:t>8/30/2019</a:t>
             </a:fld>
             <a:endParaRPr lang="en-US"/>
           </a:p>
@@ -1241,7 +1241,7 @@
           <a:p>
             <a:fld id="{E2DC313C-E62C-4C22-A1E0-847D782FC8C3}" type="datetimeFigureOut">
               <a:rPr lang="en-US" smtClean="0"/>
-              <a:t>5/22/2019</a:t>
+              <a:t>8/30/2019</a:t>
             </a:fld>
             <a:endParaRPr lang="en-US"/>
           </a:p>
@@ -1608,7 +1608,7 @@
           <a:p>
             <a:fld id="{E2DC313C-E62C-4C22-A1E0-847D782FC8C3}" type="datetimeFigureOut">
               <a:rPr lang="en-US" smtClean="0"/>
-              <a:t>5/22/2019</a:t>
+              <a:t>8/30/2019</a:t>
             </a:fld>
             <a:endParaRPr lang="en-US"/>
           </a:p>
@@ -1726,7 +1726,7 @@
           <a:p>
             <a:fld id="{E2DC313C-E62C-4C22-A1E0-847D782FC8C3}" type="datetimeFigureOut">
               <a:rPr lang="en-US" smtClean="0"/>
-              <a:t>5/22/2019</a:t>
+              <a:t>8/30/2019</a:t>
             </a:fld>
             <a:endParaRPr lang="en-US"/>
           </a:p>
@@ -1821,7 +1821,7 @@
           <a:p>
             <a:fld id="{E2DC313C-E62C-4C22-A1E0-847D782FC8C3}" type="datetimeFigureOut">
               <a:rPr lang="en-US" smtClean="0"/>
-              <a:t>5/22/2019</a:t>
+              <a:t>8/30/2019</a:t>
             </a:fld>
             <a:endParaRPr lang="en-US"/>
           </a:p>
@@ -2098,7 +2098,7 @@
           <a:p>
             <a:fld id="{E2DC313C-E62C-4C22-A1E0-847D782FC8C3}" type="datetimeFigureOut">
               <a:rPr lang="en-US" smtClean="0"/>
-              <a:t>5/22/2019</a:t>
+              <a:t>8/30/2019</a:t>
             </a:fld>
             <a:endParaRPr lang="en-US"/>
           </a:p>
@@ -2351,7 +2351,7 @@
           <a:p>
             <a:fld id="{E2DC313C-E62C-4C22-A1E0-847D782FC8C3}" type="datetimeFigureOut">
               <a:rPr lang="en-US" smtClean="0"/>
-              <a:t>5/22/2019</a:t>
+              <a:t>8/30/2019</a:t>
             </a:fld>
             <a:endParaRPr lang="en-US"/>
           </a:p>
@@ -2564,7 +2564,7 @@
           <a:p>
             <a:fld id="{E2DC313C-E62C-4C22-A1E0-847D782FC8C3}" type="datetimeFigureOut">
               <a:rPr lang="en-US" smtClean="0"/>
-              <a:t>5/22/2019</a:t>
+              <a:t>8/30/2019</a:t>
             </a:fld>
             <a:endParaRPr lang="en-US"/>
           </a:p>
@@ -3830,9 +3830,9 @@
         <p:grpSpPr>
           <a:xfrm>
             <a:off x="3865267" y="5739474"/>
-            <a:ext cx="2693056" cy="369332"/>
+            <a:ext cx="2370853" cy="369332"/>
             <a:chOff x="991319" y="1606552"/>
-            <a:chExt cx="2693056" cy="369332"/>
+            <a:chExt cx="2370853" cy="369332"/>
           </a:xfrm>
         </p:grpSpPr>
         <p:pic>
@@ -3875,7 +3875,7 @@
           <p:spPr>
             <a:xfrm>
               <a:off x="1307699" y="1606552"/>
-              <a:ext cx="2376676" cy="369332"/>
+              <a:ext cx="2054473" cy="369332"/>
             </a:xfrm>
             <a:prstGeom prst="rect">
               <a:avLst/>
@@ -3894,7 +3894,7 @@
                     <a:schemeClr val="bg1"/>
                   </a:solidFill>
                 </a:rPr>
-                <a:t>DevZest.Data.DbDesign</a:t>
+                <a:t>DevZest.Data.DbInit</a:t>
               </a:r>
               <a:endParaRPr lang="en-US" dirty="0">
                 <a:solidFill>

</xml_diff>